<commit_message>
Narrative description of prototype1 added
</commit_message>
<xml_diff>
--- a/prototype1.pptx
+++ b/prototype1.pptx
@@ -6,6 +6,7 @@
   </p:sldMasterIdLst>
   <p:sldIdLst>
     <p:sldId id="260" r:id="rId2"/>
+    <p:sldId id="261" r:id="rId3"/>
   </p:sldIdLst>
   <p:sldSz cx="9144000" cy="6858000" type="screen4x3"/>
   <p:notesSz cx="7010400" cy="9296400"/>
@@ -247,7 +248,7 @@
           <a:p>
             <a:fld id="{30A16676-75FE-49CB-BBC4-003708A678FE}" type="datetimeFigureOut">
               <a:rPr lang="en-US" smtClean="0"/>
-              <a:t>2018-06-26</a:t>
+              <a:t>2018-07-11</a:t>
             </a:fld>
             <a:endParaRPr lang="en-US"/>
           </a:p>
@@ -417,7 +418,7 @@
           <a:p>
             <a:fld id="{30A16676-75FE-49CB-BBC4-003708A678FE}" type="datetimeFigureOut">
               <a:rPr lang="en-US" smtClean="0"/>
-              <a:t>2018-06-26</a:t>
+              <a:t>2018-07-11</a:t>
             </a:fld>
             <a:endParaRPr lang="en-US"/>
           </a:p>
@@ -597,7 +598,7 @@
           <a:p>
             <a:fld id="{30A16676-75FE-49CB-BBC4-003708A678FE}" type="datetimeFigureOut">
               <a:rPr lang="en-US" smtClean="0"/>
-              <a:t>2018-06-26</a:t>
+              <a:t>2018-07-11</a:t>
             </a:fld>
             <a:endParaRPr lang="en-US"/>
           </a:p>
@@ -813,7 +814,7 @@
           <a:p>
             <a:fld id="{30A16676-75FE-49CB-BBC4-003708A678FE}" type="datetimeFigureOut">
               <a:rPr lang="en-US" smtClean="0"/>
-              <a:t>2018-06-26</a:t>
+              <a:t>2018-07-11</a:t>
             </a:fld>
             <a:endParaRPr lang="en-US"/>
           </a:p>
@@ -1057,7 +1058,7 @@
           <a:p>
             <a:fld id="{30A16676-75FE-49CB-BBC4-003708A678FE}" type="datetimeFigureOut">
               <a:rPr lang="en-US" smtClean="0"/>
-              <a:t>2018-06-26</a:t>
+              <a:t>2018-07-11</a:t>
             </a:fld>
             <a:endParaRPr lang="en-US"/>
           </a:p>
@@ -1289,7 +1290,7 @@
           <a:p>
             <a:fld id="{30A16676-75FE-49CB-BBC4-003708A678FE}" type="datetimeFigureOut">
               <a:rPr lang="en-US" smtClean="0"/>
-              <a:t>2018-06-26</a:t>
+              <a:t>2018-07-11</a:t>
             </a:fld>
             <a:endParaRPr lang="en-US"/>
           </a:p>
@@ -1656,7 +1657,7 @@
           <a:p>
             <a:fld id="{30A16676-75FE-49CB-BBC4-003708A678FE}" type="datetimeFigureOut">
               <a:rPr lang="en-US" smtClean="0"/>
-              <a:t>2018-06-26</a:t>
+              <a:t>2018-07-11</a:t>
             </a:fld>
             <a:endParaRPr lang="en-US"/>
           </a:p>
@@ -1785,7 +1786,7 @@
           <a:p>
             <a:fld id="{30A16676-75FE-49CB-BBC4-003708A678FE}" type="datetimeFigureOut">
               <a:rPr lang="en-US" smtClean="0"/>
-              <a:t>2018-06-26</a:t>
+              <a:t>2018-07-11</a:t>
             </a:fld>
             <a:endParaRPr lang="en-US"/>
           </a:p>
@@ -1880,7 +1881,7 @@
           <a:p>
             <a:fld id="{30A16676-75FE-49CB-BBC4-003708A678FE}" type="datetimeFigureOut">
               <a:rPr lang="en-US" smtClean="0"/>
-              <a:t>2018-06-26</a:t>
+              <a:t>2018-07-11</a:t>
             </a:fld>
             <a:endParaRPr lang="en-US"/>
           </a:p>
@@ -2157,7 +2158,7 @@
           <a:p>
             <a:fld id="{30A16676-75FE-49CB-BBC4-003708A678FE}" type="datetimeFigureOut">
               <a:rPr lang="en-US" smtClean="0"/>
-              <a:t>2018-06-26</a:t>
+              <a:t>2018-07-11</a:t>
             </a:fld>
             <a:endParaRPr lang="en-US"/>
           </a:p>
@@ -2414,7 +2415,7 @@
           <a:p>
             <a:fld id="{30A16676-75FE-49CB-BBC4-003708A678FE}" type="datetimeFigureOut">
               <a:rPr lang="en-US" smtClean="0"/>
-              <a:t>2018-06-26</a:t>
+              <a:t>2018-07-11</a:t>
             </a:fld>
             <a:endParaRPr lang="en-US"/>
           </a:p>
@@ -2627,7 +2628,7 @@
           <a:p>
             <a:fld id="{30A16676-75FE-49CB-BBC4-003708A678FE}" type="datetimeFigureOut">
               <a:rPr lang="en-US" smtClean="0"/>
-              <a:t>2018-06-26</a:t>
+              <a:t>2018-07-11</a:t>
             </a:fld>
             <a:endParaRPr lang="en-US"/>
           </a:p>
@@ -4717,6 +4718,955 @@
 </p:sld>
 </file>
 
+<file path=ppt/slides/slide2.xml><?xml version="1.0" encoding="utf-8"?>
+<p:sld xmlns:a="http://schemas.openxmlformats.org/drawingml/2006/main" xmlns:r="http://schemas.openxmlformats.org/officeDocument/2006/relationships" xmlns:p="http://schemas.openxmlformats.org/presentationml/2006/main">
+  <p:cSld>
+    <p:spTree>
+      <p:nvGrpSpPr>
+        <p:cNvPr id="1" name=""/>
+        <p:cNvGrpSpPr/>
+        <p:nvPr/>
+      </p:nvGrpSpPr>
+      <p:grpSpPr>
+        <a:xfrm>
+          <a:off x="0" y="0"/>
+          <a:ext cx="0" cy="0"/>
+          <a:chOff x="0" y="0"/>
+          <a:chExt cx="0" cy="0"/>
+        </a:xfrm>
+      </p:grpSpPr>
+      <p:sp>
+        <p:nvSpPr>
+          <p:cNvPr id="2" name="TextBox 1">
+            <a:extLst>
+              <a:ext uri="{FF2B5EF4-FFF2-40B4-BE49-F238E27FC236}">
+                <a16:creationId xmlns:a16="http://schemas.microsoft.com/office/drawing/2014/main" id="{EC1829BA-646A-48C4-8D8E-35616F2D263D}"/>
+              </a:ext>
+            </a:extLst>
+          </p:cNvPr>
+          <p:cNvSpPr txBox="1"/>
+          <p:nvPr/>
+        </p:nvSpPr>
+        <p:spPr>
+          <a:xfrm>
+            <a:off x="342900" y="371475"/>
+            <a:ext cx="2790825" cy="369332"/>
+          </a:xfrm>
+          <a:prstGeom prst="rect">
+            <a:avLst/>
+          </a:prstGeom>
+          <a:noFill/>
+        </p:spPr>
+        <p:txBody>
+          <a:bodyPr wrap="square" rtlCol="0">
+            <a:spAutoFit/>
+          </a:bodyPr>
+          <a:lstStyle/>
+          <a:p>
+            <a:r>
+              <a:rPr lang="en-US" dirty="0"/>
+              <a:t>Prototype1 Narrative</a:t>
+            </a:r>
+          </a:p>
+        </p:txBody>
+      </p:sp>
+      <p:sp>
+        <p:nvSpPr>
+          <p:cNvPr id="3" name="TextBox 2">
+            <a:extLst>
+              <a:ext uri="{FF2B5EF4-FFF2-40B4-BE49-F238E27FC236}">
+                <a16:creationId xmlns:a16="http://schemas.microsoft.com/office/drawing/2014/main" id="{BB14B5D6-3496-4FDF-B042-4C7975DC36D3}"/>
+              </a:ext>
+            </a:extLst>
+          </p:cNvPr>
+          <p:cNvSpPr txBox="1"/>
+          <p:nvPr/>
+        </p:nvSpPr>
+        <p:spPr>
+          <a:xfrm>
+            <a:off x="447676" y="866775"/>
+            <a:ext cx="4655946" cy="4708981"/>
+          </a:xfrm>
+          <a:prstGeom prst="rect">
+            <a:avLst/>
+          </a:prstGeom>
+          <a:noFill/>
+        </p:spPr>
+        <p:txBody>
+          <a:bodyPr wrap="square" rtlCol="0">
+            <a:spAutoFit/>
+          </a:bodyPr>
+          <a:lstStyle/>
+          <a:p>
+            <a:r>
+              <a:rPr lang="en-US" sz="1000" dirty="0"/>
+              <a:t>Prototype1 is meant to be a very simplified version of the WMA water supply system that will get people going on how to simulate the basic operations of a reservoir. It has the following key features:</a:t>
+            </a:r>
+          </a:p>
+          <a:p>
+            <a:pPr marL="171450" indent="-171450">
+              <a:buFont typeface="Arial" panose="020B0604020202020204" pitchFamily="34" charset="0"/>
+              <a:buChar char="•"/>
+            </a:pPr>
+            <a:r>
+              <a:rPr lang="en-US" sz="1000" dirty="0"/>
+              <a:t>Time step: daily</a:t>
+            </a:r>
+          </a:p>
+          <a:p>
+            <a:pPr marL="171450" indent="-171450">
+              <a:buFont typeface="Arial" panose="020B0604020202020204" pitchFamily="34" charset="0"/>
+              <a:buChar char="•"/>
+            </a:pPr>
+            <a:r>
+              <a:rPr lang="en-US" sz="1000" dirty="0"/>
+              <a:t>Reservoirs</a:t>
+            </a:r>
+          </a:p>
+          <a:p>
+            <a:pPr marL="628650" lvl="1" indent="-171450">
+              <a:buFont typeface="Arial" panose="020B0604020202020204" pitchFamily="34" charset="0"/>
+              <a:buChar char="•"/>
+            </a:pPr>
+            <a:r>
+              <a:rPr lang="en-US" sz="1000" dirty="0"/>
+              <a:t>Little Seneca</a:t>
+            </a:r>
+          </a:p>
+          <a:p>
+            <a:pPr marL="628650" lvl="1" indent="-171450">
+              <a:buFont typeface="Arial" panose="020B0604020202020204" pitchFamily="34" charset="0"/>
+              <a:buChar char="•"/>
+            </a:pPr>
+            <a:r>
+              <a:rPr lang="en-US" sz="1000" dirty="0"/>
+              <a:t>“North Branch Reservoir” (</a:t>
+            </a:r>
+            <a:r>
+              <a:rPr lang="en-US" sz="1000" dirty="0" err="1"/>
+              <a:t>NBr</a:t>
+            </a:r>
+            <a:r>
+              <a:rPr lang="en-US" sz="1000" dirty="0"/>
+              <a:t>) – a fictitious combination of Jennings and Savage</a:t>
+            </a:r>
+          </a:p>
+          <a:p>
+            <a:pPr marL="171450" indent="-171450">
+              <a:buFont typeface="Arial" panose="020B0604020202020204" pitchFamily="34" charset="0"/>
+              <a:buChar char="•"/>
+            </a:pPr>
+            <a:r>
+              <a:rPr lang="en-US" sz="1000" dirty="0"/>
+              <a:t>Input time series: derived from PRRISM (From 1929-10-01 to 2013-12-31) (all </a:t>
+            </a:r>
+            <a:r>
+              <a:rPr lang="en-US" sz="1000" dirty="0" err="1"/>
+              <a:t>mgd</a:t>
+            </a:r>
+            <a:r>
+              <a:rPr lang="en-US" sz="1000" dirty="0"/>
+              <a:t>)</a:t>
+            </a:r>
+          </a:p>
+          <a:p>
+            <a:pPr marL="628650" lvl="1" indent="-171450">
+              <a:buFont typeface="Arial" panose="020B0604020202020204" pitchFamily="34" charset="0"/>
+              <a:buChar char="•"/>
+            </a:pPr>
+            <a:r>
+              <a:rPr lang="en-US" sz="1000" dirty="0"/>
+              <a:t>lfalls_nat_daily.csv – Little Falls “natural flow” - without effects of reservoir watersheds &amp; without WMA withdrawals</a:t>
+            </a:r>
+          </a:p>
+          <a:p>
+            <a:pPr marL="628650" lvl="1" indent="-171450">
+              <a:buFont typeface="Arial" panose="020B0604020202020204" pitchFamily="34" charset="0"/>
+              <a:buChar char="•"/>
+            </a:pPr>
+            <a:r>
+              <a:rPr lang="en-US" sz="1000" dirty="0"/>
+              <a:t>nbr_res_inflow_daily.csv – </a:t>
+            </a:r>
+            <a:r>
+              <a:rPr lang="en-US" sz="1000" dirty="0" err="1"/>
+              <a:t>NBr</a:t>
+            </a:r>
+            <a:r>
+              <a:rPr lang="en-US" sz="1000" dirty="0"/>
+              <a:t> inflows (sum of Jennings &amp; Savage inflows)</a:t>
+            </a:r>
+          </a:p>
+          <a:p>
+            <a:pPr marL="628650" lvl="1" indent="-171450">
+              <a:buFont typeface="Arial" panose="020B0604020202020204" pitchFamily="34" charset="0"/>
+              <a:buChar char="•"/>
+            </a:pPr>
+            <a:r>
+              <a:rPr lang="en-US" sz="1000" dirty="0"/>
+              <a:t>seneca_res_inflow_daily.csv – Little Seneca Reservoir inflows</a:t>
+            </a:r>
+          </a:p>
+          <a:p>
+            <a:pPr marL="628650" lvl="1" indent="-171450">
+              <a:buFont typeface="Arial" panose="020B0604020202020204" pitchFamily="34" charset="0"/>
+              <a:buChar char="•"/>
+            </a:pPr>
+            <a:r>
+              <a:rPr lang="en-US" sz="1000" dirty="0"/>
+              <a:t>wma_demand_daily.csv – a time series of total WMA daily demands that I output from PRRISM</a:t>
+            </a:r>
+          </a:p>
+          <a:p>
+            <a:pPr marL="171450" indent="-171450">
+              <a:buFont typeface="Arial" panose="020B0604020202020204" pitchFamily="34" charset="0"/>
+              <a:buChar char="•"/>
+            </a:pPr>
+            <a:r>
+              <a:rPr lang="en-US" sz="1000" dirty="0"/>
+              <a:t>Flow forecasts – we need Potomac River flow forecasts for Little Falls (“adjusted”, that is, flow before water supply withdrawals) to make water supply releases</a:t>
+            </a:r>
+          </a:p>
+          <a:p>
+            <a:pPr marL="628650" lvl="1" indent="-171450">
+              <a:buFont typeface="Arial" panose="020B0604020202020204" pitchFamily="34" charset="0"/>
+              <a:buChar char="•"/>
+            </a:pPr>
+            <a:r>
+              <a:rPr lang="en-US" sz="1000" dirty="0"/>
+              <a:t>9-day flow forecast for </a:t>
+            </a:r>
+            <a:r>
+              <a:rPr lang="en-US" sz="1000" dirty="0" err="1"/>
+              <a:t>NBr</a:t>
+            </a:r>
+            <a:r>
+              <a:rPr lang="en-US" sz="1000" dirty="0"/>
+              <a:t> release – use the empirical equation we use in PRRISM – see Ahmed et al. (2015) Eq. 5-1, p. 5-5</a:t>
+            </a:r>
+          </a:p>
+          <a:p>
+            <a:pPr marL="628650" lvl="1" indent="-171450">
+              <a:buFont typeface="Arial" panose="020B0604020202020204" pitchFamily="34" charset="0"/>
+              <a:buChar char="•"/>
+            </a:pPr>
+            <a:r>
+              <a:rPr lang="en-US" sz="1000" dirty="0"/>
+              <a:t>0-day forecast for L Seneca release – assume perfect knowledge, as we used to do in PRRISM, </a:t>
+            </a:r>
+            <a:r>
+              <a:rPr lang="en-US" sz="1000" dirty="0" err="1"/>
+              <a:t>ie</a:t>
+            </a:r>
+            <a:r>
+              <a:rPr lang="en-US" sz="1000" dirty="0"/>
+              <a:t> flow is today’s known Little Falls “adjusted” flow</a:t>
+            </a:r>
+          </a:p>
+          <a:p>
+            <a:pPr marL="171450" indent="-171450">
+              <a:buFont typeface="Arial" panose="020B0604020202020204" pitchFamily="34" charset="0"/>
+              <a:buChar char="•"/>
+            </a:pPr>
+            <a:r>
+              <a:rPr lang="en-US" sz="1000" dirty="0"/>
+              <a:t>Demand forecasts – for now just use the demands in the input demand time series</a:t>
+            </a:r>
+          </a:p>
+          <a:p>
+            <a:pPr marL="171450" indent="-171450">
+              <a:buFont typeface="Arial" panose="020B0604020202020204" pitchFamily="34" charset="0"/>
+              <a:buChar char="•"/>
+            </a:pPr>
+            <a:r>
+              <a:rPr lang="en-US" sz="1000" dirty="0"/>
+              <a:t>Reservoir operations: in prototype1 is simulating</a:t>
+            </a:r>
+          </a:p>
+          <a:p>
+            <a:pPr marL="628650" lvl="1" indent="-171450">
+              <a:buFont typeface="Arial" panose="020B0604020202020204" pitchFamily="34" charset="0"/>
+              <a:buChar char="•"/>
+            </a:pPr>
+            <a:r>
+              <a:rPr lang="en-US" sz="1000" dirty="0"/>
+              <a:t>capacity – a constant</a:t>
+            </a:r>
+          </a:p>
+          <a:p>
+            <a:pPr marL="628650" lvl="1" indent="-171450">
+              <a:buFont typeface="Arial" panose="020B0604020202020204" pitchFamily="34" charset="0"/>
+              <a:buChar char="•"/>
+            </a:pPr>
+            <a:r>
+              <a:rPr lang="en-US" sz="1000" dirty="0"/>
+              <a:t>storage – beginning of day (bop) storage volume </a:t>
+            </a:r>
+          </a:p>
+          <a:p>
+            <a:pPr marL="628650" lvl="1" indent="-171450">
+              <a:buFont typeface="Arial" panose="020B0604020202020204" pitchFamily="34" charset="0"/>
+              <a:buChar char="•"/>
+            </a:pPr>
+            <a:r>
+              <a:rPr lang="en-US" sz="1000" dirty="0" err="1"/>
+              <a:t>flowby</a:t>
+            </a:r>
+            <a:r>
+              <a:rPr lang="en-US" sz="1000" dirty="0"/>
+              <a:t> – minimum release for environmental purposes - a constant in prototype1</a:t>
+            </a:r>
+          </a:p>
+          <a:p>
+            <a:pPr marL="628650" lvl="1" indent="-171450">
+              <a:buFont typeface="Arial" panose="020B0604020202020204" pitchFamily="34" charset="0"/>
+              <a:buChar char="•"/>
+            </a:pPr>
+            <a:r>
+              <a:rPr lang="en-US" sz="1000" dirty="0" err="1"/>
+              <a:t>ws_release</a:t>
+            </a:r>
+            <a:r>
+              <a:rPr lang="en-US" sz="1000" dirty="0"/>
+              <a:t>:  water supply release = need = demand + 100 – flow forecast</a:t>
+            </a:r>
+          </a:p>
+          <a:p>
+            <a:pPr marL="628650" lvl="1" indent="-171450">
+              <a:buFont typeface="Arial" panose="020B0604020202020204" pitchFamily="34" charset="0"/>
+              <a:buChar char="•"/>
+            </a:pPr>
+            <a:r>
+              <a:rPr lang="en-US" sz="1000" dirty="0"/>
+              <a:t>inflow – from the daily inflow time series</a:t>
+            </a:r>
+          </a:p>
+          <a:p>
+            <a:pPr marL="628650" lvl="1" indent="-171450">
+              <a:buFont typeface="Arial" panose="020B0604020202020204" pitchFamily="34" charset="0"/>
+              <a:buChar char="•"/>
+            </a:pPr>
+            <a:r>
+              <a:rPr lang="en-US" sz="1000" dirty="0"/>
+              <a:t>outflow – into the receiving stream</a:t>
+            </a:r>
+          </a:p>
+        </p:txBody>
+      </p:sp>
+      <p:grpSp>
+        <p:nvGrpSpPr>
+          <p:cNvPr id="8" name="Group 7">
+            <a:extLst>
+              <a:ext uri="{FF2B5EF4-FFF2-40B4-BE49-F238E27FC236}">
+                <a16:creationId xmlns:a16="http://schemas.microsoft.com/office/drawing/2014/main" id="{6D812D41-49C7-4354-BA4E-0952E412FA6B}"/>
+              </a:ext>
+            </a:extLst>
+          </p:cNvPr>
+          <p:cNvGrpSpPr/>
+          <p:nvPr/>
+        </p:nvGrpSpPr>
+        <p:grpSpPr>
+          <a:xfrm>
+            <a:off x="5621077" y="1070344"/>
+            <a:ext cx="1920951" cy="1297172"/>
+            <a:chOff x="6131440" y="1070344"/>
+            <a:chExt cx="1920951" cy="1297172"/>
+          </a:xfrm>
+        </p:grpSpPr>
+        <p:sp>
+          <p:nvSpPr>
+            <p:cNvPr id="4" name="Rectangle: Top Corners Snipped 3">
+              <a:extLst>
+                <a:ext uri="{FF2B5EF4-FFF2-40B4-BE49-F238E27FC236}">
+                  <a16:creationId xmlns:a16="http://schemas.microsoft.com/office/drawing/2014/main" id="{7D04F945-4E46-4D01-8367-B9530A521F6E}"/>
+                </a:ext>
+              </a:extLst>
+            </p:cNvPr>
+            <p:cNvSpPr/>
+            <p:nvPr/>
+          </p:nvSpPr>
+          <p:spPr>
+            <a:xfrm rot="10800000">
+              <a:off x="6131442" y="1070344"/>
+              <a:ext cx="1920949" cy="1297172"/>
+            </a:xfrm>
+            <a:prstGeom prst="snip2SameRect">
+              <a:avLst/>
+            </a:prstGeom>
+            <a:solidFill>
+              <a:schemeClr val="accent1">
+                <a:lumMod val="20000"/>
+                <a:lumOff val="80000"/>
+              </a:schemeClr>
+            </a:solidFill>
+          </p:spPr>
+          <p:style>
+            <a:lnRef idx="2">
+              <a:schemeClr val="accent1">
+                <a:shade val="50000"/>
+              </a:schemeClr>
+            </a:lnRef>
+            <a:fillRef idx="1">
+              <a:schemeClr val="accent1"/>
+            </a:fillRef>
+            <a:effectRef idx="0">
+              <a:schemeClr val="accent1"/>
+            </a:effectRef>
+            <a:fontRef idx="minor">
+              <a:schemeClr val="lt1"/>
+            </a:fontRef>
+          </p:style>
+          <p:txBody>
+            <a:bodyPr rtlCol="0" anchor="ctr"/>
+            <a:lstStyle/>
+            <a:p>
+              <a:pPr algn="ctr"/>
+              <a:endParaRPr lang="en-US"/>
+            </a:p>
+          </p:txBody>
+        </p:sp>
+        <p:sp>
+          <p:nvSpPr>
+            <p:cNvPr id="5" name="Rectangle: Top Corners Snipped 4">
+              <a:extLst>
+                <a:ext uri="{FF2B5EF4-FFF2-40B4-BE49-F238E27FC236}">
+                  <a16:creationId xmlns:a16="http://schemas.microsoft.com/office/drawing/2014/main" id="{1AC6440F-B4DF-4A61-A430-8AD56CCEAA6C}"/>
+                </a:ext>
+              </a:extLst>
+            </p:cNvPr>
+            <p:cNvSpPr/>
+            <p:nvPr/>
+          </p:nvSpPr>
+          <p:spPr>
+            <a:xfrm rot="10800000">
+              <a:off x="6131440" y="1481468"/>
+              <a:ext cx="1920949" cy="886047"/>
+            </a:xfrm>
+            <a:prstGeom prst="snip2SameRect">
+              <a:avLst/>
+            </a:prstGeom>
+            <a:solidFill>
+              <a:schemeClr val="accent1">
+                <a:lumMod val="60000"/>
+                <a:lumOff val="40000"/>
+              </a:schemeClr>
+            </a:solidFill>
+          </p:spPr>
+          <p:style>
+            <a:lnRef idx="2">
+              <a:schemeClr val="accent1">
+                <a:shade val="50000"/>
+              </a:schemeClr>
+            </a:lnRef>
+            <a:fillRef idx="1">
+              <a:schemeClr val="accent1"/>
+            </a:fillRef>
+            <a:effectRef idx="0">
+              <a:schemeClr val="accent1"/>
+            </a:effectRef>
+            <a:fontRef idx="minor">
+              <a:schemeClr val="lt1"/>
+            </a:fontRef>
+          </p:style>
+          <p:txBody>
+            <a:bodyPr rtlCol="0" anchor="ctr"/>
+            <a:lstStyle/>
+            <a:p>
+              <a:pPr algn="ctr"/>
+              <a:endParaRPr lang="en-US"/>
+            </a:p>
+          </p:txBody>
+        </p:sp>
+      </p:grpSp>
+      <p:cxnSp>
+        <p:nvCxnSpPr>
+          <p:cNvPr id="7" name="Straight Connector 6">
+            <a:extLst>
+              <a:ext uri="{FF2B5EF4-FFF2-40B4-BE49-F238E27FC236}">
+                <a16:creationId xmlns:a16="http://schemas.microsoft.com/office/drawing/2014/main" id="{245FF331-1AEC-4826-81D9-0A048837A396}"/>
+              </a:ext>
+            </a:extLst>
+          </p:cNvPr>
+          <p:cNvCxnSpPr>
+            <a:cxnSpLocks/>
+          </p:cNvCxnSpPr>
+          <p:nvPr/>
+        </p:nvCxnSpPr>
+        <p:spPr>
+          <a:xfrm>
+            <a:off x="7542026" y="1070343"/>
+            <a:ext cx="425304" cy="0"/>
+          </a:xfrm>
+          <a:prstGeom prst="line">
+            <a:avLst/>
+          </a:prstGeom>
+          <a:ln w="28575">
+            <a:prstDash val="sysDash"/>
+          </a:ln>
+        </p:spPr>
+        <p:style>
+          <a:lnRef idx="1">
+            <a:schemeClr val="accent1"/>
+          </a:lnRef>
+          <a:fillRef idx="0">
+            <a:schemeClr val="accent1"/>
+          </a:fillRef>
+          <a:effectRef idx="0">
+            <a:schemeClr val="accent1"/>
+          </a:effectRef>
+          <a:fontRef idx="minor">
+            <a:schemeClr val="tx1"/>
+          </a:fontRef>
+        </p:style>
+      </p:cxnSp>
+      <p:cxnSp>
+        <p:nvCxnSpPr>
+          <p:cNvPr id="10" name="Straight Connector 9">
+            <a:extLst>
+              <a:ext uri="{FF2B5EF4-FFF2-40B4-BE49-F238E27FC236}">
+                <a16:creationId xmlns:a16="http://schemas.microsoft.com/office/drawing/2014/main" id="{45D72B28-1B5D-4485-BC11-02BA377ACC29}"/>
+              </a:ext>
+            </a:extLst>
+          </p:cNvPr>
+          <p:cNvCxnSpPr>
+            <a:cxnSpLocks/>
+          </p:cNvCxnSpPr>
+          <p:nvPr/>
+        </p:nvCxnSpPr>
+        <p:spPr>
+          <a:xfrm>
+            <a:off x="7542026" y="1481467"/>
+            <a:ext cx="425304" cy="0"/>
+          </a:xfrm>
+          <a:prstGeom prst="line">
+            <a:avLst/>
+          </a:prstGeom>
+          <a:ln w="28575">
+            <a:prstDash val="sysDash"/>
+          </a:ln>
+        </p:spPr>
+        <p:style>
+          <a:lnRef idx="1">
+            <a:schemeClr val="accent1"/>
+          </a:lnRef>
+          <a:fillRef idx="0">
+            <a:schemeClr val="accent1"/>
+          </a:fillRef>
+          <a:effectRef idx="0">
+            <a:schemeClr val="accent1"/>
+          </a:effectRef>
+          <a:fontRef idx="minor">
+            <a:schemeClr val="tx1"/>
+          </a:fontRef>
+        </p:style>
+      </p:cxnSp>
+      <p:sp>
+        <p:nvSpPr>
+          <p:cNvPr id="11" name="TextBox 10">
+            <a:extLst>
+              <a:ext uri="{FF2B5EF4-FFF2-40B4-BE49-F238E27FC236}">
+                <a16:creationId xmlns:a16="http://schemas.microsoft.com/office/drawing/2014/main" id="{1B48653E-BB34-404F-8206-07F3345E59EF}"/>
+              </a:ext>
+            </a:extLst>
+          </p:cNvPr>
+          <p:cNvSpPr txBox="1"/>
+          <p:nvPr/>
+        </p:nvSpPr>
+        <p:spPr>
+          <a:xfrm>
+            <a:off x="7946071" y="940144"/>
+            <a:ext cx="623777" cy="246221"/>
+          </a:xfrm>
+          <a:prstGeom prst="rect">
+            <a:avLst/>
+          </a:prstGeom>
+          <a:noFill/>
+        </p:spPr>
+        <p:txBody>
+          <a:bodyPr wrap="square" rtlCol="0">
+            <a:spAutoFit/>
+          </a:bodyPr>
+          <a:lstStyle/>
+          <a:p>
+            <a:r>
+              <a:rPr lang="en-US" sz="1000" dirty="0">
+                <a:solidFill>
+                  <a:schemeClr val="accent1">
+                    <a:lumMod val="75000"/>
+                  </a:schemeClr>
+                </a:solidFill>
+              </a:rPr>
+              <a:t>capacity</a:t>
+            </a:r>
+          </a:p>
+        </p:txBody>
+      </p:sp>
+      <p:sp>
+        <p:nvSpPr>
+          <p:cNvPr id="12" name="TextBox 11">
+            <a:extLst>
+              <a:ext uri="{FF2B5EF4-FFF2-40B4-BE49-F238E27FC236}">
+                <a16:creationId xmlns:a16="http://schemas.microsoft.com/office/drawing/2014/main" id="{683DF30D-F01A-47B5-959A-9EB6ACD4F2B8}"/>
+              </a:ext>
+            </a:extLst>
+          </p:cNvPr>
+          <p:cNvSpPr txBox="1"/>
+          <p:nvPr/>
+        </p:nvSpPr>
+        <p:spPr>
+          <a:xfrm>
+            <a:off x="7967336" y="1358356"/>
+            <a:ext cx="623777" cy="246221"/>
+          </a:xfrm>
+          <a:prstGeom prst="rect">
+            <a:avLst/>
+          </a:prstGeom>
+          <a:noFill/>
+        </p:spPr>
+        <p:txBody>
+          <a:bodyPr wrap="square" rtlCol="0">
+            <a:spAutoFit/>
+          </a:bodyPr>
+          <a:lstStyle/>
+          <a:p>
+            <a:r>
+              <a:rPr lang="en-US" sz="1000" dirty="0">
+                <a:solidFill>
+                  <a:schemeClr val="accent1">
+                    <a:lumMod val="75000"/>
+                  </a:schemeClr>
+                </a:solidFill>
+              </a:rPr>
+              <a:t>storage</a:t>
+            </a:r>
+          </a:p>
+        </p:txBody>
+      </p:sp>
+      <p:sp>
+        <p:nvSpPr>
+          <p:cNvPr id="13" name="TextBox 12">
+            <a:extLst>
+              <a:ext uri="{FF2B5EF4-FFF2-40B4-BE49-F238E27FC236}">
+                <a16:creationId xmlns:a16="http://schemas.microsoft.com/office/drawing/2014/main" id="{508AC3C2-25DD-4519-BB7B-9C8F595201B8}"/>
+              </a:ext>
+            </a:extLst>
+          </p:cNvPr>
+          <p:cNvSpPr txBox="1"/>
+          <p:nvPr/>
+        </p:nvSpPr>
+        <p:spPr>
+          <a:xfrm>
+            <a:off x="5436781" y="2721934"/>
+            <a:ext cx="3423684" cy="276999"/>
+          </a:xfrm>
+          <a:prstGeom prst="rect">
+            <a:avLst/>
+          </a:prstGeom>
+          <a:noFill/>
+        </p:spPr>
+        <p:txBody>
+          <a:bodyPr wrap="square" rtlCol="0">
+            <a:spAutoFit/>
+          </a:bodyPr>
+          <a:lstStyle/>
+          <a:p>
+            <a:r>
+              <a:rPr lang="en-US" sz="1200" dirty="0">
+                <a:solidFill>
+                  <a:schemeClr val="accent1">
+                    <a:lumMod val="75000"/>
+                  </a:schemeClr>
+                </a:solidFill>
+              </a:rPr>
+              <a:t>Water balance equation for BOP storage on day i+1:</a:t>
+            </a:r>
+          </a:p>
+        </p:txBody>
+      </p:sp>
+      <p:sp>
+        <p:nvSpPr>
+          <p:cNvPr id="15" name="TextBox 14">
+            <a:extLst>
+              <a:ext uri="{FF2B5EF4-FFF2-40B4-BE49-F238E27FC236}">
+                <a16:creationId xmlns:a16="http://schemas.microsoft.com/office/drawing/2014/main" id="{8D07FBF7-C5AE-4690-B49A-E881C08B2004}"/>
+              </a:ext>
+            </a:extLst>
+          </p:cNvPr>
+          <p:cNvSpPr txBox="1"/>
+          <p:nvPr/>
+        </p:nvSpPr>
+        <p:spPr>
+          <a:xfrm>
+            <a:off x="5436781" y="3687160"/>
+            <a:ext cx="2665230" cy="261610"/>
+          </a:xfrm>
+          <a:prstGeom prst="rect">
+            <a:avLst/>
+          </a:prstGeom>
+          <a:noFill/>
+        </p:spPr>
+        <p:txBody>
+          <a:bodyPr wrap="square" rtlCol="0">
+            <a:spAutoFit/>
+          </a:bodyPr>
+          <a:lstStyle/>
+          <a:p>
+            <a:r>
+              <a:rPr lang="en-US" sz="1100" i="1" dirty="0">
+                <a:solidFill>
+                  <a:schemeClr val="accent1">
+                    <a:lumMod val="75000"/>
+                  </a:schemeClr>
+                </a:solidFill>
+              </a:rPr>
+              <a:t>Subject to constraints:</a:t>
+            </a:r>
+          </a:p>
+        </p:txBody>
+      </p:sp>
+      <p:sp>
+        <p:nvSpPr>
+          <p:cNvPr id="16" name="TextBox 15">
+            <a:extLst>
+              <a:ext uri="{FF2B5EF4-FFF2-40B4-BE49-F238E27FC236}">
+                <a16:creationId xmlns:a16="http://schemas.microsoft.com/office/drawing/2014/main" id="{28AFD5C1-E60D-40B1-8CEA-914335F0A8F7}"/>
+              </a:ext>
+            </a:extLst>
+          </p:cNvPr>
+          <p:cNvSpPr txBox="1"/>
+          <p:nvPr/>
+        </p:nvSpPr>
+        <p:spPr>
+          <a:xfrm>
+            <a:off x="5528929" y="3948770"/>
+            <a:ext cx="3225211" cy="1015663"/>
+          </a:xfrm>
+          <a:prstGeom prst="rect">
+            <a:avLst/>
+          </a:prstGeom>
+          <a:noFill/>
+        </p:spPr>
+        <p:txBody>
+          <a:bodyPr wrap="square" rtlCol="0">
+            <a:spAutoFit/>
+          </a:bodyPr>
+          <a:lstStyle/>
+          <a:p>
+            <a:r>
+              <a:rPr lang="en-US" sz="1000" dirty="0"/>
+              <a:t>storage</a:t>
+            </a:r>
+            <a:r>
+              <a:rPr lang="en-US" sz="1000" baseline="-25000" dirty="0"/>
+              <a:t> </a:t>
+            </a:r>
+            <a:r>
+              <a:rPr lang="en-US" sz="1000" baseline="-25000" dirty="0" err="1"/>
+              <a:t>i</a:t>
+            </a:r>
+            <a:r>
+              <a:rPr lang="en-US" sz="1000" dirty="0"/>
+              <a:t> &lt;= capacity</a:t>
+            </a:r>
+          </a:p>
+          <a:p>
+            <a:r>
+              <a:rPr lang="en-US" sz="1000" dirty="0"/>
+              <a:t>storage</a:t>
+            </a:r>
+            <a:r>
+              <a:rPr lang="en-US" sz="1000" baseline="-25000" dirty="0"/>
+              <a:t> </a:t>
+            </a:r>
+            <a:r>
+              <a:rPr lang="en-US" sz="1000" baseline="-25000" dirty="0" err="1"/>
+              <a:t>i</a:t>
+            </a:r>
+            <a:r>
+              <a:rPr lang="en-US" sz="1000" dirty="0"/>
+              <a:t> &gt;= 0</a:t>
+            </a:r>
+          </a:p>
+          <a:p>
+            <a:r>
+              <a:rPr lang="en-US" sz="1000" dirty="0"/>
+              <a:t>outflow</a:t>
+            </a:r>
+            <a:r>
+              <a:rPr lang="en-US" sz="1000" baseline="-25000" dirty="0"/>
+              <a:t> </a:t>
+            </a:r>
+            <a:r>
+              <a:rPr lang="en-US" sz="1000" baseline="-25000" dirty="0" err="1"/>
+              <a:t>i</a:t>
+            </a:r>
+            <a:r>
+              <a:rPr lang="en-US" sz="1000" dirty="0"/>
+              <a:t> &gt;= </a:t>
+            </a:r>
+            <a:r>
+              <a:rPr lang="en-US" sz="1000" dirty="0" err="1"/>
+              <a:t>flowby</a:t>
+            </a:r>
+            <a:r>
+              <a:rPr lang="en-US" sz="1000" dirty="0"/>
+              <a:t>, </a:t>
+            </a:r>
+            <a:r>
+              <a:rPr lang="en-US" sz="1000" u="sng" dirty="0"/>
+              <a:t>assuming</a:t>
+            </a:r>
+            <a:r>
+              <a:rPr lang="en-US" sz="1000" dirty="0"/>
+              <a:t> there’s </a:t>
+            </a:r>
+            <a:r>
+              <a:rPr lang="en-US" sz="1000" u="sng" dirty="0"/>
+              <a:t>enough</a:t>
+            </a:r>
+            <a:r>
+              <a:rPr lang="en-US" sz="1000" dirty="0"/>
+              <a:t> water</a:t>
+            </a:r>
+          </a:p>
+          <a:p>
+            <a:r>
+              <a:rPr lang="en-US" sz="1000" dirty="0"/>
+              <a:t>outflow</a:t>
+            </a:r>
+            <a:r>
+              <a:rPr lang="en-US" sz="1000" baseline="-25000" dirty="0"/>
+              <a:t> </a:t>
+            </a:r>
+            <a:r>
+              <a:rPr lang="en-US" sz="1000" baseline="-25000" dirty="0" err="1"/>
+              <a:t>i</a:t>
+            </a:r>
+            <a:r>
+              <a:rPr lang="en-US" sz="1000" dirty="0"/>
+              <a:t> &gt;= </a:t>
+            </a:r>
+            <a:r>
+              <a:rPr lang="en-US" sz="1000" dirty="0" err="1"/>
+              <a:t>ws_release</a:t>
+            </a:r>
+            <a:r>
+              <a:rPr lang="en-US" sz="1000" dirty="0"/>
+              <a:t>, </a:t>
+            </a:r>
+            <a:r>
+              <a:rPr lang="en-US" sz="1000" u="sng" dirty="0"/>
+              <a:t>assuming</a:t>
+            </a:r>
+            <a:r>
+              <a:rPr lang="en-US" sz="1000" dirty="0"/>
+              <a:t> there’s </a:t>
+            </a:r>
+            <a:r>
+              <a:rPr lang="en-US" sz="1000" u="sng" dirty="0"/>
+              <a:t>enough</a:t>
+            </a:r>
+            <a:r>
+              <a:rPr lang="en-US" sz="1000" dirty="0"/>
+              <a:t> water</a:t>
+            </a:r>
+          </a:p>
+          <a:p>
+            <a:endParaRPr lang="en-US" sz="1000" dirty="0"/>
+          </a:p>
+          <a:p>
+            <a:endParaRPr lang="en-US" sz="1000" dirty="0"/>
+          </a:p>
+        </p:txBody>
+      </p:sp>
+      <p:sp>
+        <p:nvSpPr>
+          <p:cNvPr id="17" name="Rectangle 16">
+            <a:extLst>
+              <a:ext uri="{FF2B5EF4-FFF2-40B4-BE49-F238E27FC236}">
+                <a16:creationId xmlns:a16="http://schemas.microsoft.com/office/drawing/2014/main" id="{CCB96332-E49A-4762-A97D-2782E9387CB7}"/>
+              </a:ext>
+            </a:extLst>
+          </p:cNvPr>
+          <p:cNvSpPr/>
+          <p:nvPr/>
+        </p:nvSpPr>
+        <p:spPr>
+          <a:xfrm>
+            <a:off x="5621077" y="2998933"/>
+            <a:ext cx="2714849" cy="447226"/>
+          </a:xfrm>
+          <a:prstGeom prst="rect">
+            <a:avLst/>
+          </a:prstGeom>
+        </p:spPr>
+        <p:style>
+          <a:lnRef idx="2">
+            <a:schemeClr val="accent5"/>
+          </a:lnRef>
+          <a:fillRef idx="1">
+            <a:schemeClr val="lt1"/>
+          </a:fillRef>
+          <a:effectRef idx="0">
+            <a:schemeClr val="accent5"/>
+          </a:effectRef>
+          <a:fontRef idx="minor">
+            <a:schemeClr val="dk1"/>
+          </a:fontRef>
+        </p:style>
+        <p:txBody>
+          <a:bodyPr rtlCol="0" anchor="ctr"/>
+          <a:lstStyle/>
+          <a:p>
+            <a:r>
+              <a:rPr lang="en-US" sz="1100"/>
+              <a:t>storage</a:t>
+            </a:r>
+            <a:r>
+              <a:rPr lang="en-US" sz="1100" baseline="-25000"/>
+              <a:t> i+1</a:t>
+            </a:r>
+            <a:r>
+              <a:rPr lang="en-US" sz="1100"/>
+              <a:t> = storage</a:t>
+            </a:r>
+            <a:r>
+              <a:rPr lang="en-US" sz="1100" baseline="-25000"/>
+              <a:t> i</a:t>
+            </a:r>
+            <a:r>
+              <a:rPr lang="en-US" sz="1100"/>
+              <a:t> + inflow</a:t>
+            </a:r>
+            <a:r>
+              <a:rPr lang="en-US" sz="1100" baseline="-25000"/>
+              <a:t> i</a:t>
+            </a:r>
+            <a:r>
+              <a:rPr lang="en-US" sz="1100"/>
+              <a:t> – outflow</a:t>
+            </a:r>
+            <a:r>
+              <a:rPr lang="en-US" sz="1100" baseline="-25000"/>
+              <a:t> i</a:t>
+            </a:r>
+            <a:endParaRPr lang="en-US" sz="1100" baseline="-25000" dirty="0"/>
+          </a:p>
+        </p:txBody>
+      </p:sp>
+    </p:spTree>
+    <p:extLst>
+      <p:ext uri="{BB962C8B-B14F-4D97-AF65-F5344CB8AC3E}">
+        <p14:creationId xmlns:p14="http://schemas.microsoft.com/office/powerpoint/2010/main" val="2412411127"/>
+      </p:ext>
+    </p:extLst>
+  </p:cSld>
+  <p:clrMapOvr>
+    <a:masterClrMapping/>
+  </p:clrMapOvr>
+</p:sld>
+</file>
+
 <file path=ppt/theme/theme1.xml><?xml version="1.0" encoding="utf-8"?>
 <a:theme xmlns:a="http://schemas.openxmlformats.org/drawingml/2006/main" name="Office Theme">
   <a:themeElements>

</xml_diff>

<commit_message>
Narrative added; variable names revised
</commit_message>
<xml_diff>
--- a/prototype1.pptx
+++ b/prototype1.pptx
@@ -248,7 +248,7 @@
           <a:p>
             <a:fld id="{30A16676-75FE-49CB-BBC4-003708A678FE}" type="datetimeFigureOut">
               <a:rPr lang="en-US" smtClean="0"/>
-              <a:t>2018-07-11</a:t>
+              <a:t>2018-07-13</a:t>
             </a:fld>
             <a:endParaRPr lang="en-US"/>
           </a:p>
@@ -418,7 +418,7 @@
           <a:p>
             <a:fld id="{30A16676-75FE-49CB-BBC4-003708A678FE}" type="datetimeFigureOut">
               <a:rPr lang="en-US" smtClean="0"/>
-              <a:t>2018-07-11</a:t>
+              <a:t>2018-07-13</a:t>
             </a:fld>
             <a:endParaRPr lang="en-US"/>
           </a:p>
@@ -598,7 +598,7 @@
           <a:p>
             <a:fld id="{30A16676-75FE-49CB-BBC4-003708A678FE}" type="datetimeFigureOut">
               <a:rPr lang="en-US" smtClean="0"/>
-              <a:t>2018-07-11</a:t>
+              <a:t>2018-07-13</a:t>
             </a:fld>
             <a:endParaRPr lang="en-US"/>
           </a:p>
@@ -814,7 +814,7 @@
           <a:p>
             <a:fld id="{30A16676-75FE-49CB-BBC4-003708A678FE}" type="datetimeFigureOut">
               <a:rPr lang="en-US" smtClean="0"/>
-              <a:t>2018-07-11</a:t>
+              <a:t>2018-07-13</a:t>
             </a:fld>
             <a:endParaRPr lang="en-US"/>
           </a:p>
@@ -1058,7 +1058,7 @@
           <a:p>
             <a:fld id="{30A16676-75FE-49CB-BBC4-003708A678FE}" type="datetimeFigureOut">
               <a:rPr lang="en-US" smtClean="0"/>
-              <a:t>2018-07-11</a:t>
+              <a:t>2018-07-13</a:t>
             </a:fld>
             <a:endParaRPr lang="en-US"/>
           </a:p>
@@ -1290,7 +1290,7 @@
           <a:p>
             <a:fld id="{30A16676-75FE-49CB-BBC4-003708A678FE}" type="datetimeFigureOut">
               <a:rPr lang="en-US" smtClean="0"/>
-              <a:t>2018-07-11</a:t>
+              <a:t>2018-07-13</a:t>
             </a:fld>
             <a:endParaRPr lang="en-US"/>
           </a:p>
@@ -1657,7 +1657,7 @@
           <a:p>
             <a:fld id="{30A16676-75FE-49CB-BBC4-003708A678FE}" type="datetimeFigureOut">
               <a:rPr lang="en-US" smtClean="0"/>
-              <a:t>2018-07-11</a:t>
+              <a:t>2018-07-13</a:t>
             </a:fld>
             <a:endParaRPr lang="en-US"/>
           </a:p>
@@ -1786,7 +1786,7 @@
           <a:p>
             <a:fld id="{30A16676-75FE-49CB-BBC4-003708A678FE}" type="datetimeFigureOut">
               <a:rPr lang="en-US" smtClean="0"/>
-              <a:t>2018-07-11</a:t>
+              <a:t>2018-07-13</a:t>
             </a:fld>
             <a:endParaRPr lang="en-US"/>
           </a:p>
@@ -1881,7 +1881,7 @@
           <a:p>
             <a:fld id="{30A16676-75FE-49CB-BBC4-003708A678FE}" type="datetimeFigureOut">
               <a:rPr lang="en-US" smtClean="0"/>
-              <a:t>2018-07-11</a:t>
+              <a:t>2018-07-13</a:t>
             </a:fld>
             <a:endParaRPr lang="en-US"/>
           </a:p>
@@ -2158,7 +2158,7 @@
           <a:p>
             <a:fld id="{30A16676-75FE-49CB-BBC4-003708A678FE}" type="datetimeFigureOut">
               <a:rPr lang="en-US" smtClean="0"/>
-              <a:t>2018-07-11</a:t>
+              <a:t>2018-07-13</a:t>
             </a:fld>
             <a:endParaRPr lang="en-US"/>
           </a:p>
@@ -2415,7 +2415,7 @@
           <a:p>
             <a:fld id="{30A16676-75FE-49CB-BBC4-003708A678FE}" type="datetimeFigureOut">
               <a:rPr lang="en-US" smtClean="0"/>
-              <a:t>2018-07-11</a:t>
+              <a:t>2018-07-13</a:t>
             </a:fld>
             <a:endParaRPr lang="en-US"/>
           </a:p>
@@ -2628,7 +2628,7 @@
           <a:p>
             <a:fld id="{30A16676-75FE-49CB-BBC4-003708A678FE}" type="datetimeFigureOut">
               <a:rPr lang="en-US" smtClean="0"/>
-              <a:t>2018-07-11</a:t>
+              <a:t>2018-07-13</a:t>
             </a:fld>
             <a:endParaRPr lang="en-US"/>
           </a:p>
@@ -3078,6 +3078,7 @@
               <a:rPr lang="en-US" sz="1000" dirty="0"/>
               <a:t>North Branch Reservoir</a:t>
             </a:r>
+            <a:endParaRPr lang="en-US" sz="800" dirty="0"/>
           </a:p>
           <a:p>
             <a:pPr marL="91440" indent="-91440">
@@ -3086,11 +3087,11 @@
             </a:pPr>
             <a:r>
               <a:rPr lang="en-US" sz="800" dirty="0" err="1"/>
-              <a:t>nbr_res_stor</a:t>
+              <a:t>nbr_capacity</a:t>
             </a:r>
             <a:r>
               <a:rPr lang="en-US" sz="800" dirty="0"/>
-              <a:t> (storage)</a:t>
+              <a:t> (constant) </a:t>
             </a:r>
           </a:p>
           <a:p>
@@ -3100,19 +3101,11 @@
             </a:pPr>
             <a:r>
               <a:rPr lang="en-US" sz="800" dirty="0" err="1"/>
-              <a:t>nbr_res</a:t>
+              <a:t>nbr_flowby</a:t>
             </a:r>
             <a:r>
               <a:rPr lang="en-US" sz="800" dirty="0"/>
-              <a:t> _</a:t>
-            </a:r>
-            <a:r>
-              <a:rPr lang="en-US" sz="800" dirty="0" err="1"/>
-              <a:t>withdr</a:t>
-            </a:r>
-            <a:r>
-              <a:rPr lang="en-US" sz="800" dirty="0"/>
-              <a:t> (withdrawal)</a:t>
+              <a:t> (constant)</a:t>
             </a:r>
           </a:p>
           <a:p>
@@ -3122,29 +3115,41 @@
             </a:pPr>
             <a:r>
               <a:rPr lang="en-US" sz="800" dirty="0" err="1"/>
-              <a:t>nbr_res</a:t>
-            </a:r>
-            <a:r>
-              <a:rPr lang="en-US" sz="800" dirty="0"/>
-              <a:t> _</a:t>
-            </a:r>
-            <a:r>
-              <a:rPr lang="en-US" sz="800" dirty="0" err="1"/>
-              <a:t>rel</a:t>
-            </a:r>
-            <a:r>
-              <a:rPr lang="en-US" sz="800" dirty="0"/>
-              <a:t> (release)</a:t>
-            </a:r>
+              <a:t>nbr_storage</a:t>
+            </a:r>
+            <a:endParaRPr lang="en-US" sz="800" dirty="0"/>
           </a:p>
           <a:p>
             <a:pPr marL="91440" indent="-91440">
               <a:buFont typeface="Arial" panose="020B0604020202020204" pitchFamily="34" charset="0"/>
               <a:buChar char="•"/>
             </a:pPr>
+            <a:r>
+              <a:rPr lang="en-US" sz="800" dirty="0" err="1"/>
+              <a:t>nbr_ws_release</a:t>
+            </a:r>
             <a:endParaRPr lang="en-US" sz="800" dirty="0"/>
           </a:p>
           <a:p>
+            <a:pPr marL="91440" indent="-91440">
+              <a:buFont typeface="Arial" panose="020B0604020202020204" pitchFamily="34" charset="0"/>
+              <a:buChar char="•"/>
+            </a:pPr>
+            <a:r>
+              <a:rPr lang="en-US" sz="800" dirty="0" err="1"/>
+              <a:t>nbr_inflow</a:t>
+            </a:r>
+            <a:endParaRPr lang="en-US" sz="800" dirty="0"/>
+          </a:p>
+          <a:p>
+            <a:pPr marL="91440" indent="-91440">
+              <a:buFont typeface="Arial" panose="020B0604020202020204" pitchFamily="34" charset="0"/>
+              <a:buChar char="•"/>
+            </a:pPr>
+            <a:r>
+              <a:rPr lang="en-US" sz="800" dirty="0" err="1"/>
+              <a:t>nbr_outflow</a:t>
+            </a:r>
             <a:endParaRPr lang="en-US" sz="800" dirty="0"/>
           </a:p>
         </p:txBody>
@@ -3285,9 +3290,12 @@
             </a:pPr>
             <a:r>
               <a:rPr lang="en-US" sz="800" dirty="0" err="1"/>
-              <a:t>seneca_res_storage</a:t>
-            </a:r>
-            <a:endParaRPr lang="en-US" sz="800" dirty="0"/>
+              <a:t>sen_capacity</a:t>
+            </a:r>
+            <a:r>
+              <a:rPr lang="en-US" sz="800" dirty="0"/>
+              <a:t> (constant) </a:t>
+            </a:r>
           </a:p>
           <a:p>
             <a:pPr marL="91440" indent="-91440">
@@ -3296,9 +3304,12 @@
             </a:pPr>
             <a:r>
               <a:rPr lang="en-US" sz="800" dirty="0" err="1"/>
-              <a:t>Seneca_res_release_spill</a:t>
-            </a:r>
-            <a:endParaRPr lang="en-US" sz="800" dirty="0"/>
+              <a:t>sen_flowby</a:t>
+            </a:r>
+            <a:r>
+              <a:rPr lang="en-US" sz="800" dirty="0"/>
+              <a:t> (constant)</a:t>
+            </a:r>
           </a:p>
           <a:p>
             <a:pPr marL="91440" indent="-91440">
@@ -3307,15 +3318,7 @@
             </a:pPr>
             <a:r>
               <a:rPr lang="en-US" sz="800" dirty="0" err="1"/>
-              <a:t>seneca_res</a:t>
-            </a:r>
-            <a:r>
-              <a:rPr lang="en-US" sz="800" dirty="0"/>
-              <a:t> _</a:t>
-            </a:r>
-            <a:r>
-              <a:rPr lang="en-US" sz="800" dirty="0" err="1"/>
-              <a:t>release_wq</a:t>
+              <a:t>sen_storage</a:t>
             </a:r>
             <a:endParaRPr lang="en-US" sz="800" dirty="0"/>
           </a:p>
@@ -3326,21 +3329,31 @@
             </a:pPr>
             <a:r>
               <a:rPr lang="en-US" sz="800" dirty="0" err="1"/>
-              <a:t>seneca_res</a:t>
-            </a:r>
-            <a:r>
-              <a:rPr lang="en-US" sz="800" dirty="0"/>
-              <a:t> _</a:t>
-            </a:r>
+              <a:t>sen_ws_release</a:t>
+            </a:r>
+            <a:endParaRPr lang="en-US" sz="800" dirty="0"/>
+          </a:p>
+          <a:p>
+            <a:pPr marL="91440" indent="-91440">
+              <a:buFont typeface="Arial" panose="020B0604020202020204" pitchFamily="34" charset="0"/>
+              <a:buChar char="•"/>
+            </a:pPr>
             <a:r>
               <a:rPr lang="en-US" sz="800" dirty="0" err="1"/>
-              <a:t>release_ws</a:t>
+              <a:t>sen_inflow</a:t>
             </a:r>
             <a:endParaRPr lang="en-US" sz="800" dirty="0"/>
           </a:p>
           <a:p>
-            <a:pPr algn="ctr"/>
-            <a:endParaRPr lang="en-US" sz="1400" dirty="0"/>
+            <a:pPr marL="91440" indent="-91440">
+              <a:buFont typeface="Arial" panose="020B0604020202020204" pitchFamily="34" charset="0"/>
+              <a:buChar char="•"/>
+            </a:pPr>
+            <a:r>
+              <a:rPr lang="en-US" sz="800" dirty="0" err="1"/>
+              <a:t>sen_outflow</a:t>
+            </a:r>
+            <a:endParaRPr lang="en-US" sz="800" dirty="0"/>
           </a:p>
         </p:txBody>
       </p:sp>
@@ -4914,7 +4927,7 @@
             </a:pPr>
             <a:r>
               <a:rPr lang="en-US" sz="1000" dirty="0"/>
-              <a:t>wma_demand_daily.csv – a time series of total WMA daily demands that I output from PRRISM</a:t>
+              <a:t>wma_demand_daily.csv – a time series of total WMA daily demands that I took from PRRISM output</a:t>
             </a:r>
           </a:p>
           <a:p>

</xml_diff>